<commit_message>
finished movement functionality tests
</commit_message>
<xml_diff>
--- a/MovementFigure.pptx
+++ b/MovementFigure.pptx
@@ -104,6 +104,11 @@
       </a:defRPr>
     </a:lvl9pPr>
   </p:defaultTextStyle>
+  <p:extLst>
+    <p:ext uri="{EFAFB233-063F-42B5-8137-9DF3F51BA10A}">
+      <p15:sldGuideLst xmlns:p15="http://schemas.microsoft.com/office/powerpoint/2012/main"/>
+    </p:ext>
+  </p:extLst>
 </p:presentation>
 </file>
 
@@ -238,7 +243,7 @@
           <a:p>
             <a:fld id="{960F5710-38A5-4B7B-BD6E-26E21143EC0D}" type="datetimeFigureOut">
               <a:rPr lang="en-US" smtClean="0"/>
-              <a:t>10/21/2024</a:t>
+              <a:t>10/30/2024</a:t>
             </a:fld>
             <a:endParaRPr lang="en-US"/>
           </a:p>
@@ -408,7 +413,7 @@
           <a:p>
             <a:fld id="{960F5710-38A5-4B7B-BD6E-26E21143EC0D}" type="datetimeFigureOut">
               <a:rPr lang="en-US" smtClean="0"/>
-              <a:t>10/21/2024</a:t>
+              <a:t>10/30/2024</a:t>
             </a:fld>
             <a:endParaRPr lang="en-US"/>
           </a:p>
@@ -588,7 +593,7 @@
           <a:p>
             <a:fld id="{960F5710-38A5-4B7B-BD6E-26E21143EC0D}" type="datetimeFigureOut">
               <a:rPr lang="en-US" smtClean="0"/>
-              <a:t>10/21/2024</a:t>
+              <a:t>10/30/2024</a:t>
             </a:fld>
             <a:endParaRPr lang="en-US"/>
           </a:p>
@@ -758,7 +763,7 @@
           <a:p>
             <a:fld id="{960F5710-38A5-4B7B-BD6E-26E21143EC0D}" type="datetimeFigureOut">
               <a:rPr lang="en-US" smtClean="0"/>
-              <a:t>10/21/2024</a:t>
+              <a:t>10/30/2024</a:t>
             </a:fld>
             <a:endParaRPr lang="en-US"/>
           </a:p>
@@ -1004,7 +1009,7 @@
           <a:p>
             <a:fld id="{960F5710-38A5-4B7B-BD6E-26E21143EC0D}" type="datetimeFigureOut">
               <a:rPr lang="en-US" smtClean="0"/>
-              <a:t>10/21/2024</a:t>
+              <a:t>10/30/2024</a:t>
             </a:fld>
             <a:endParaRPr lang="en-US"/>
           </a:p>
@@ -1236,7 +1241,7 @@
           <a:p>
             <a:fld id="{960F5710-38A5-4B7B-BD6E-26E21143EC0D}" type="datetimeFigureOut">
               <a:rPr lang="en-US" smtClean="0"/>
-              <a:t>10/21/2024</a:t>
+              <a:t>10/30/2024</a:t>
             </a:fld>
             <a:endParaRPr lang="en-US"/>
           </a:p>
@@ -1603,7 +1608,7 @@
           <a:p>
             <a:fld id="{960F5710-38A5-4B7B-BD6E-26E21143EC0D}" type="datetimeFigureOut">
               <a:rPr lang="en-US" smtClean="0"/>
-              <a:t>10/21/2024</a:t>
+              <a:t>10/30/2024</a:t>
             </a:fld>
             <a:endParaRPr lang="en-US"/>
           </a:p>
@@ -1721,7 +1726,7 @@
           <a:p>
             <a:fld id="{960F5710-38A5-4B7B-BD6E-26E21143EC0D}" type="datetimeFigureOut">
               <a:rPr lang="en-US" smtClean="0"/>
-              <a:t>10/21/2024</a:t>
+              <a:t>10/30/2024</a:t>
             </a:fld>
             <a:endParaRPr lang="en-US"/>
           </a:p>
@@ -1816,7 +1821,7 @@
           <a:p>
             <a:fld id="{960F5710-38A5-4B7B-BD6E-26E21143EC0D}" type="datetimeFigureOut">
               <a:rPr lang="en-US" smtClean="0"/>
-              <a:t>10/21/2024</a:t>
+              <a:t>10/30/2024</a:t>
             </a:fld>
             <a:endParaRPr lang="en-US"/>
           </a:p>
@@ -2093,7 +2098,7 @@
           <a:p>
             <a:fld id="{960F5710-38A5-4B7B-BD6E-26E21143EC0D}" type="datetimeFigureOut">
               <a:rPr lang="en-US" smtClean="0"/>
-              <a:t>10/21/2024</a:t>
+              <a:t>10/30/2024</a:t>
             </a:fld>
             <a:endParaRPr lang="en-US"/>
           </a:p>
@@ -2350,7 +2355,7 @@
           <a:p>
             <a:fld id="{960F5710-38A5-4B7B-BD6E-26E21143EC0D}" type="datetimeFigureOut">
               <a:rPr lang="en-US" smtClean="0"/>
-              <a:t>10/21/2024</a:t>
+              <a:t>10/30/2024</a:t>
             </a:fld>
             <a:endParaRPr lang="en-US"/>
           </a:p>
@@ -2563,7 +2568,7 @@
           <a:p>
             <a:fld id="{960F5710-38A5-4B7B-BD6E-26E21143EC0D}" type="datetimeFigureOut">
               <a:rPr lang="en-US" smtClean="0"/>
-              <a:t>10/21/2024</a:t>
+              <a:t>10/30/2024</a:t>
             </a:fld>
             <a:endParaRPr lang="en-US"/>
           </a:p>
@@ -2983,7 +2988,7 @@
           <p:nvPr>
             <p:extLst>
               <p:ext uri="{D42A27DB-BD31-4B8C-83A1-F6EECF244321}">
-                <p14:modId xmlns:p14="http://schemas.microsoft.com/office/powerpoint/2010/main" val="112066901"/>
+                <p14:modId xmlns:p14="http://schemas.microsoft.com/office/powerpoint/2010/main" val="1059099373"/>
               </p:ext>
             </p:extLst>
           </p:nvPr>
@@ -3115,9 +3120,7 @@
                       <a:tailEnd type="none" w="med" len="med"/>
                     </a:lnT>
                     <a:lnB w="12700" cap="flat" cmpd="sng" algn="ctr">
-                      <a:solidFill>
-                        <a:schemeClr val="tx1"/>
-                      </a:solidFill>
+                      <a:noFill/>
                       <a:prstDash val="dash"/>
                       <a:round/>
                       <a:headEnd type="none" w="med" len="med"/>
@@ -3167,9 +3170,7 @@
                       <a:tailEnd type="none" w="med" len="med"/>
                     </a:lnT>
                     <a:lnB w="12700" cap="flat" cmpd="sng" algn="ctr">
-                      <a:solidFill>
-                        <a:schemeClr val="tx1"/>
-                      </a:solidFill>
+                      <a:noFill/>
                       <a:prstDash val="dash"/>
                       <a:round/>
                       <a:headEnd type="none" w="med" len="med"/>
@@ -3222,9 +3223,7 @@
                       <a:tailEnd type="none" w="med" len="med"/>
                     </a:lnT>
                     <a:lnB w="12700" cap="flat" cmpd="sng" algn="ctr">
-                      <a:solidFill>
-                        <a:schemeClr val="tx1"/>
-                      </a:solidFill>
+                      <a:noFill/>
                       <a:prstDash val="dash"/>
                       <a:round/>
                       <a:headEnd type="none" w="med" len="med"/>
@@ -3320,9 +3319,7 @@
                       <a:tailEnd type="none" w="med" len="med"/>
                     </a:lnL>
                     <a:lnR w="12700" cap="flat" cmpd="sng" algn="ctr">
-                      <a:solidFill>
-                        <a:schemeClr val="tx1"/>
-                      </a:solidFill>
+                      <a:noFill/>
                       <a:prstDash val="dash"/>
                       <a:round/>
                       <a:headEnd type="none" w="med" len="med"/>
@@ -3363,9 +3360,7 @@
                   </a:txBody>
                   <a:tcPr marL="68580" marR="68580" marT="34290" marB="34290">
                     <a:lnL w="12700" cap="flat" cmpd="sng" algn="ctr">
-                      <a:solidFill>
-                        <a:schemeClr val="tx1"/>
-                      </a:solidFill>
+                      <a:noFill/>
                       <a:prstDash val="dash"/>
                       <a:round/>
                       <a:headEnd type="none" w="med" len="med"/>
@@ -3379,9 +3374,7 @@
                       <a:tailEnd type="none" w="med" len="med"/>
                     </a:lnR>
                     <a:lnT w="12700" cap="flat" cmpd="sng" algn="ctr">
-                      <a:solidFill>
-                        <a:schemeClr val="tx1"/>
-                      </a:solidFill>
+                      <a:noFill/>
                       <a:prstDash val="dash"/>
                       <a:round/>
                       <a:headEnd type="none" w="med" len="med"/>
@@ -3431,9 +3424,7 @@
                       <a:tailEnd type="none" w="med" len="med"/>
                     </a:lnR>
                     <a:lnT w="12700" cap="flat" cmpd="sng" algn="ctr">
-                      <a:solidFill>
-                        <a:schemeClr val="tx1"/>
-                      </a:solidFill>
+                      <a:noFill/>
                       <a:prstDash val="dash"/>
                       <a:round/>
                       <a:headEnd type="none" w="med" len="med"/>
@@ -3476,18 +3467,14 @@
                       <a:tailEnd type="none" w="med" len="med"/>
                     </a:lnL>
                     <a:lnR w="12700" cap="flat" cmpd="sng" algn="ctr">
-                      <a:solidFill>
-                        <a:schemeClr val="tx1"/>
-                      </a:solidFill>
+                      <a:noFill/>
                       <a:prstDash val="dash"/>
                       <a:round/>
                       <a:headEnd type="none" w="med" len="med"/>
                       <a:tailEnd type="none" w="med" len="med"/>
                     </a:lnR>
                     <a:lnT w="12700" cap="flat" cmpd="sng" algn="ctr">
-                      <a:solidFill>
-                        <a:schemeClr val="tx1"/>
-                      </a:solidFill>
+                      <a:noFill/>
                       <a:prstDash val="dash"/>
                       <a:round/>
                       <a:headEnd type="none" w="med" len="med"/>
@@ -3526,9 +3513,7 @@
                   </a:txBody>
                   <a:tcPr marL="68580" marR="68580" marT="34290" marB="34290">
                     <a:lnL w="12700" cap="flat" cmpd="sng" algn="ctr">
-                      <a:solidFill>
-                        <a:schemeClr val="tx1"/>
-                      </a:solidFill>
+                      <a:noFill/>
                       <a:prstDash val="dash"/>
                       <a:round/>
                       <a:headEnd type="none" w="med" len="med"/>
@@ -3595,9 +3580,7 @@
                       <a:tailEnd type="none" w="med" len="med"/>
                     </a:lnL>
                     <a:lnR w="12700" cap="flat" cmpd="sng" algn="ctr">
-                      <a:solidFill>
-                        <a:schemeClr val="tx1"/>
-                      </a:solidFill>
+                      <a:noFill/>
                       <a:prstDash val="dash"/>
                       <a:round/>
                       <a:headEnd type="none" w="med" len="med"/>
@@ -3638,9 +3621,7 @@
                   </a:txBody>
                   <a:tcPr marL="68580" marR="68580" marT="34290" marB="34290">
                     <a:lnL w="12700" cap="flat" cmpd="sng" algn="ctr">
-                      <a:solidFill>
-                        <a:schemeClr val="tx1"/>
-                      </a:solidFill>
+                      <a:noFill/>
                       <a:prstDash val="dash"/>
                       <a:round/>
                       <a:headEnd type="none" w="med" len="med"/>
@@ -3755,9 +3736,7 @@
                       <a:tailEnd type="none" w="med" len="med"/>
                     </a:lnL>
                     <a:lnR w="12700" cap="flat" cmpd="sng" algn="ctr">
-                      <a:solidFill>
-                        <a:schemeClr val="tx1"/>
-                      </a:solidFill>
+                      <a:noFill/>
                       <a:prstDash val="dash"/>
                       <a:round/>
                       <a:headEnd type="none" w="med" len="med"/>
@@ -3802,9 +3781,7 @@
                   </a:txBody>
                   <a:tcPr marL="68580" marR="68580" marT="34290" marB="34290">
                     <a:lnL w="12700" cap="flat" cmpd="sng" algn="ctr">
-                      <a:solidFill>
-                        <a:schemeClr val="tx1"/>
-                      </a:solidFill>
+                      <a:noFill/>
                       <a:prstDash val="dash"/>
                       <a:round/>
                       <a:headEnd type="none" w="med" len="med"/>
@@ -3868,9 +3845,7 @@
                       <a:tailEnd type="none" w="med" len="med"/>
                     </a:lnL>
                     <a:lnR w="12700" cap="flat" cmpd="sng" algn="ctr">
-                      <a:solidFill>
-                        <a:schemeClr val="tx1"/>
-                      </a:solidFill>
+                      <a:noFill/>
                       <a:prstDash val="dash"/>
                       <a:round/>
                       <a:headEnd type="none" w="med" len="med"/>
@@ -3911,9 +3886,7 @@
                   </a:txBody>
                   <a:tcPr marL="68580" marR="68580" marT="34290" marB="34290">
                     <a:lnL w="12700" cap="flat" cmpd="sng" algn="ctr">
-                      <a:solidFill>
-                        <a:schemeClr val="tx1"/>
-                      </a:solidFill>
+                      <a:noFill/>
                       <a:prstDash val="dash"/>
                       <a:round/>
                       <a:headEnd type="none" w="med" len="med"/>
@@ -3934,9 +3907,7 @@
                       <a:tailEnd type="none" w="med" len="med"/>
                     </a:lnT>
                     <a:lnB w="12700" cap="flat" cmpd="sng" algn="ctr">
-                      <a:solidFill>
-                        <a:schemeClr val="tx1"/>
-                      </a:solidFill>
+                      <a:noFill/>
                       <a:prstDash val="dash"/>
                       <a:round/>
                       <a:headEnd type="none" w="med" len="med"/>
@@ -3988,9 +3959,7 @@
                       <a:tailEnd type="none" w="med" len="med"/>
                     </a:lnT>
                     <a:lnB w="12700" cap="flat" cmpd="sng" algn="ctr">
-                      <a:solidFill>
-                        <a:schemeClr val="tx1"/>
-                      </a:solidFill>
+                      <a:noFill/>
                       <a:prstDash val="dash"/>
                       <a:round/>
                       <a:headEnd type="none" w="med" len="med"/>
@@ -4028,9 +3997,7 @@
                       <a:tailEnd type="none" w="med" len="med"/>
                     </a:lnL>
                     <a:lnR w="12700" cap="flat" cmpd="sng" algn="ctr">
-                      <a:solidFill>
-                        <a:schemeClr val="tx1"/>
-                      </a:solidFill>
+                      <a:noFill/>
                       <a:prstDash val="dash"/>
                       <a:round/>
                       <a:headEnd type="none" w="med" len="med"/>
@@ -4044,9 +4011,7 @@
                       <a:tailEnd type="none" w="med" len="med"/>
                     </a:lnT>
                     <a:lnB w="12700" cap="flat" cmpd="sng" algn="ctr">
-                      <a:solidFill>
-                        <a:schemeClr val="tx1"/>
-                      </a:solidFill>
+                      <a:noFill/>
                       <a:prstDash val="dash"/>
                       <a:round/>
                       <a:headEnd type="none" w="med" len="med"/>
@@ -4077,9 +4042,7 @@
                   </a:txBody>
                   <a:tcPr marL="68580" marR="68580" marT="34290" marB="34290">
                     <a:lnL w="12700" cap="flat" cmpd="sng" algn="ctr">
-                      <a:solidFill>
-                        <a:schemeClr val="tx1"/>
-                      </a:solidFill>
+                      <a:noFill/>
                       <a:prstDash val="dash"/>
                       <a:round/>
                       <a:headEnd type="none" w="med" len="med"/>
@@ -4200,9 +4163,7 @@
                       <a:tailEnd type="none" w="med" len="med"/>
                     </a:lnR>
                     <a:lnT w="12700" cap="flat" cmpd="sng" algn="ctr">
-                      <a:solidFill>
-                        <a:schemeClr val="tx1"/>
-                      </a:solidFill>
+                      <a:noFill/>
                       <a:prstDash val="dash"/>
                       <a:round/>
                       <a:headEnd type="none" w="med" len="med"/>
@@ -4250,9 +4211,7 @@
                       <a:tailEnd type="none" w="med" len="med"/>
                     </a:lnR>
                     <a:lnT w="12700" cap="flat" cmpd="sng" algn="ctr">
-                      <a:solidFill>
-                        <a:schemeClr val="tx1"/>
-                      </a:solidFill>
+                      <a:noFill/>
                       <a:prstDash val="dash"/>
                       <a:round/>
                       <a:headEnd type="none" w="med" len="med"/>
@@ -4300,9 +4259,7 @@
                       <a:tailEnd type="none" w="med" len="med"/>
                     </a:lnR>
                     <a:lnT w="12700" cap="flat" cmpd="sng" algn="ctr">
-                      <a:solidFill>
-                        <a:schemeClr val="tx1"/>
-                      </a:solidFill>
+                      <a:noFill/>
                       <a:prstDash val="dash"/>
                       <a:round/>
                       <a:headEnd type="none" w="med" len="med"/>
@@ -4399,7 +4356,7 @@
           <p:nvPr>
             <p:extLst>
               <p:ext uri="{D42A27DB-BD31-4B8C-83A1-F6EECF244321}">
-                <p14:modId xmlns:p14="http://schemas.microsoft.com/office/powerpoint/2010/main" val="102543474"/>
+                <p14:modId xmlns:p14="http://schemas.microsoft.com/office/powerpoint/2010/main" val="1966084157"/>
               </p:ext>
             </p:extLst>
           </p:nvPr>
@@ -4531,9 +4488,7 @@
                       <a:tailEnd type="none" w="med" len="med"/>
                     </a:lnT>
                     <a:lnB w="12700" cap="flat" cmpd="sng" algn="ctr">
-                      <a:solidFill>
-                        <a:schemeClr val="tx1"/>
-                      </a:solidFill>
+                      <a:noFill/>
                       <a:prstDash val="dash"/>
                       <a:round/>
                       <a:headEnd type="none" w="med" len="med"/>
@@ -4583,9 +4538,7 @@
                       <a:tailEnd type="none" w="med" len="med"/>
                     </a:lnT>
                     <a:lnB w="12700" cap="flat" cmpd="sng" algn="ctr">
-                      <a:solidFill>
-                        <a:schemeClr val="tx1"/>
-                      </a:solidFill>
+                      <a:noFill/>
                       <a:prstDash val="dash"/>
                       <a:round/>
                       <a:headEnd type="none" w="med" len="med"/>
@@ -4638,9 +4591,7 @@
                       <a:tailEnd type="none" w="med" len="med"/>
                     </a:lnT>
                     <a:lnB w="12700" cap="flat" cmpd="sng" algn="ctr">
-                      <a:solidFill>
-                        <a:schemeClr val="tx1"/>
-                      </a:solidFill>
+                      <a:noFill/>
                       <a:prstDash val="dash"/>
                       <a:round/>
                       <a:headEnd type="none" w="med" len="med"/>
@@ -4736,9 +4687,7 @@
                       <a:tailEnd type="none" w="med" len="med"/>
                     </a:lnL>
                     <a:lnR w="12700" cap="flat" cmpd="sng" algn="ctr">
-                      <a:solidFill>
-                        <a:schemeClr val="tx1"/>
-                      </a:solidFill>
+                      <a:noFill/>
                       <a:prstDash val="dash"/>
                       <a:round/>
                       <a:headEnd type="none" w="med" len="med"/>
@@ -4779,9 +4728,7 @@
                   </a:txBody>
                   <a:tcPr marL="68580" marR="68580" marT="34290" marB="34290">
                     <a:lnL w="12700" cap="flat" cmpd="sng" algn="ctr">
-                      <a:solidFill>
-                        <a:schemeClr val="tx1"/>
-                      </a:solidFill>
+                      <a:noFill/>
                       <a:prstDash val="dash"/>
                       <a:round/>
                       <a:headEnd type="none" w="med" len="med"/>
@@ -4795,9 +4742,7 @@
                       <a:tailEnd type="none" w="med" len="med"/>
                     </a:lnR>
                     <a:lnT w="12700" cap="flat" cmpd="sng" algn="ctr">
-                      <a:solidFill>
-                        <a:schemeClr val="tx1"/>
-                      </a:solidFill>
+                      <a:noFill/>
                       <a:prstDash val="dash"/>
                       <a:round/>
                       <a:headEnd type="none" w="med" len="med"/>
@@ -4847,9 +4792,7 @@
                       <a:tailEnd type="none" w="med" len="med"/>
                     </a:lnR>
                     <a:lnT w="12700" cap="flat" cmpd="sng" algn="ctr">
-                      <a:solidFill>
-                        <a:schemeClr val="tx1"/>
-                      </a:solidFill>
+                      <a:noFill/>
                       <a:prstDash val="dash"/>
                       <a:round/>
                       <a:headEnd type="none" w="med" len="med"/>
@@ -4892,18 +4835,14 @@
                       <a:tailEnd type="none" w="med" len="med"/>
                     </a:lnL>
                     <a:lnR w="12700" cap="flat" cmpd="sng" algn="ctr">
-                      <a:solidFill>
-                        <a:schemeClr val="tx1"/>
-                      </a:solidFill>
+                      <a:noFill/>
                       <a:prstDash val="dash"/>
                       <a:round/>
                       <a:headEnd type="none" w="med" len="med"/>
                       <a:tailEnd type="none" w="med" len="med"/>
                     </a:lnR>
                     <a:lnT w="12700" cap="flat" cmpd="sng" algn="ctr">
-                      <a:solidFill>
-                        <a:schemeClr val="tx1"/>
-                      </a:solidFill>
+                      <a:noFill/>
                       <a:prstDash val="dash"/>
                       <a:round/>
                       <a:headEnd type="none" w="med" len="med"/>
@@ -4942,9 +4881,7 @@
                   </a:txBody>
                   <a:tcPr marL="68580" marR="68580" marT="34290" marB="34290">
                     <a:lnL w="12700" cap="flat" cmpd="sng" algn="ctr">
-                      <a:solidFill>
-                        <a:schemeClr val="tx1"/>
-                      </a:solidFill>
+                      <a:noFill/>
                       <a:prstDash val="dash"/>
                       <a:round/>
                       <a:headEnd type="none" w="med" len="med"/>
@@ -5011,9 +4948,7 @@
                       <a:tailEnd type="none" w="med" len="med"/>
                     </a:lnL>
                     <a:lnR w="12700" cap="flat" cmpd="sng" algn="ctr">
-                      <a:solidFill>
-                        <a:schemeClr val="tx1"/>
-                      </a:solidFill>
+                      <a:noFill/>
                       <a:prstDash val="dash"/>
                       <a:round/>
                       <a:headEnd type="none" w="med" len="med"/>
@@ -5054,9 +4989,7 @@
                   </a:txBody>
                   <a:tcPr marL="68580" marR="68580" marT="34290" marB="34290">
                     <a:lnL w="12700" cap="flat" cmpd="sng" algn="ctr">
-                      <a:solidFill>
-                        <a:schemeClr val="tx1"/>
-                      </a:solidFill>
+                      <a:noFill/>
                       <a:prstDash val="dash"/>
                       <a:round/>
                       <a:headEnd type="none" w="med" len="med"/>
@@ -5171,9 +5104,7 @@
                       <a:tailEnd type="none" w="med" len="med"/>
                     </a:lnL>
                     <a:lnR w="12700" cap="flat" cmpd="sng" algn="ctr">
-                      <a:solidFill>
-                        <a:schemeClr val="tx1"/>
-                      </a:solidFill>
+                      <a:noFill/>
                       <a:prstDash val="dash"/>
                       <a:round/>
                       <a:headEnd type="none" w="med" len="med"/>
@@ -5218,9 +5149,7 @@
                   </a:txBody>
                   <a:tcPr marL="68580" marR="68580" marT="34290" marB="34290">
                     <a:lnL w="12700" cap="flat" cmpd="sng" algn="ctr">
-                      <a:solidFill>
-                        <a:schemeClr val="tx1"/>
-                      </a:solidFill>
+                      <a:noFill/>
                       <a:prstDash val="dash"/>
                       <a:round/>
                       <a:headEnd type="none" w="med" len="med"/>
@@ -5284,9 +5213,7 @@
                       <a:tailEnd type="none" w="med" len="med"/>
                     </a:lnL>
                     <a:lnR w="12700" cap="flat" cmpd="sng" algn="ctr">
-                      <a:solidFill>
-                        <a:schemeClr val="tx1"/>
-                      </a:solidFill>
+                      <a:noFill/>
                       <a:prstDash val="dash"/>
                       <a:round/>
                       <a:headEnd type="none" w="med" len="med"/>
@@ -5327,9 +5254,7 @@
                   </a:txBody>
                   <a:tcPr marL="68580" marR="68580" marT="34290" marB="34290">
                     <a:lnL w="12700" cap="flat" cmpd="sng" algn="ctr">
-                      <a:solidFill>
-                        <a:schemeClr val="tx1"/>
-                      </a:solidFill>
+                      <a:noFill/>
                       <a:prstDash val="dash"/>
                       <a:round/>
                       <a:headEnd type="none" w="med" len="med"/>
@@ -5350,9 +5275,7 @@
                       <a:tailEnd type="none" w="med" len="med"/>
                     </a:lnT>
                     <a:lnB w="12700" cap="flat" cmpd="sng" algn="ctr">
-                      <a:solidFill>
-                        <a:schemeClr val="tx1"/>
-                      </a:solidFill>
+                      <a:noFill/>
                       <a:prstDash val="dash"/>
                       <a:round/>
                       <a:headEnd type="none" w="med" len="med"/>
@@ -5404,9 +5327,7 @@
                       <a:tailEnd type="none" w="med" len="med"/>
                     </a:lnT>
                     <a:lnB w="12700" cap="flat" cmpd="sng" algn="ctr">
-                      <a:solidFill>
-                        <a:schemeClr val="tx1"/>
-                      </a:solidFill>
+                      <a:noFill/>
                       <a:prstDash val="dash"/>
                       <a:round/>
                       <a:headEnd type="none" w="med" len="med"/>
@@ -5444,9 +5365,7 @@
                       <a:tailEnd type="none" w="med" len="med"/>
                     </a:lnL>
                     <a:lnR w="12700" cap="flat" cmpd="sng" algn="ctr">
-                      <a:solidFill>
-                        <a:schemeClr val="tx1"/>
-                      </a:solidFill>
+                      <a:noFill/>
                       <a:prstDash val="dash"/>
                       <a:round/>
                       <a:headEnd type="none" w="med" len="med"/>
@@ -5460,9 +5379,7 @@
                       <a:tailEnd type="none" w="med" len="med"/>
                     </a:lnT>
                     <a:lnB w="12700" cap="flat" cmpd="sng" algn="ctr">
-                      <a:solidFill>
-                        <a:schemeClr val="tx1"/>
-                      </a:solidFill>
+                      <a:noFill/>
                       <a:prstDash val="dash"/>
                       <a:round/>
                       <a:headEnd type="none" w="med" len="med"/>
@@ -5493,9 +5410,7 @@
                   </a:txBody>
                   <a:tcPr marL="68580" marR="68580" marT="34290" marB="34290">
                     <a:lnL w="12700" cap="flat" cmpd="sng" algn="ctr">
-                      <a:solidFill>
-                        <a:schemeClr val="tx1"/>
-                      </a:solidFill>
+                      <a:noFill/>
                       <a:prstDash val="dash"/>
                       <a:round/>
                       <a:headEnd type="none" w="med" len="med"/>
@@ -5616,9 +5531,7 @@
                       <a:tailEnd type="none" w="med" len="med"/>
                     </a:lnR>
                     <a:lnT w="12700" cap="flat" cmpd="sng" algn="ctr">
-                      <a:solidFill>
-                        <a:schemeClr val="tx1"/>
-                      </a:solidFill>
+                      <a:noFill/>
                       <a:prstDash val="dash"/>
                       <a:round/>
                       <a:headEnd type="none" w="med" len="med"/>
@@ -5666,9 +5579,7 @@
                       <a:tailEnd type="none" w="med" len="med"/>
                     </a:lnR>
                     <a:lnT w="12700" cap="flat" cmpd="sng" algn="ctr">
-                      <a:solidFill>
-                        <a:schemeClr val="tx1"/>
-                      </a:solidFill>
+                      <a:noFill/>
                       <a:prstDash val="dash"/>
                       <a:round/>
                       <a:headEnd type="none" w="med" len="med"/>
@@ -5716,9 +5627,7 @@
                       <a:tailEnd type="none" w="med" len="med"/>
                     </a:lnR>
                     <a:lnT w="12700" cap="flat" cmpd="sng" algn="ctr">
-                      <a:solidFill>
-                        <a:schemeClr val="tx1"/>
-                      </a:solidFill>
+                      <a:noFill/>
                       <a:prstDash val="dash"/>
                       <a:round/>
                       <a:headEnd type="none" w="med" len="med"/>
@@ -5815,7 +5724,7 @@
           <p:nvPr>
             <p:extLst>
               <p:ext uri="{D42A27DB-BD31-4B8C-83A1-F6EECF244321}">
-                <p14:modId xmlns:p14="http://schemas.microsoft.com/office/powerpoint/2010/main" val="2737418526"/>
+                <p14:modId xmlns:p14="http://schemas.microsoft.com/office/powerpoint/2010/main" val="1803100091"/>
               </p:ext>
             </p:extLst>
           </p:nvPr>
@@ -5947,9 +5856,7 @@
                       <a:tailEnd type="none" w="med" len="med"/>
                     </a:lnT>
                     <a:lnB w="12700" cap="flat" cmpd="sng" algn="ctr">
-                      <a:solidFill>
-                        <a:schemeClr val="tx1"/>
-                      </a:solidFill>
+                      <a:noFill/>
                       <a:prstDash val="dash"/>
                       <a:round/>
                       <a:headEnd type="none" w="med" len="med"/>
@@ -5999,9 +5906,7 @@
                       <a:tailEnd type="none" w="med" len="med"/>
                     </a:lnT>
                     <a:lnB w="12700" cap="flat" cmpd="sng" algn="ctr">
-                      <a:solidFill>
-                        <a:schemeClr val="tx1"/>
-                      </a:solidFill>
+                      <a:noFill/>
                       <a:prstDash val="dash"/>
                       <a:round/>
                       <a:headEnd type="none" w="med" len="med"/>
@@ -6054,9 +5959,7 @@
                       <a:tailEnd type="none" w="med" len="med"/>
                     </a:lnT>
                     <a:lnB w="12700" cap="flat" cmpd="sng" algn="ctr">
-                      <a:solidFill>
-                        <a:schemeClr val="tx1"/>
-                      </a:solidFill>
+                      <a:noFill/>
                       <a:prstDash val="dash"/>
                       <a:round/>
                       <a:headEnd type="none" w="med" len="med"/>
@@ -6152,9 +6055,7 @@
                       <a:tailEnd type="none" w="med" len="med"/>
                     </a:lnL>
                     <a:lnR w="12700" cap="flat" cmpd="sng" algn="ctr">
-                      <a:solidFill>
-                        <a:schemeClr val="tx1"/>
-                      </a:solidFill>
+                      <a:noFill/>
                       <a:prstDash val="dash"/>
                       <a:round/>
                       <a:headEnd type="none" w="med" len="med"/>
@@ -6195,9 +6096,7 @@
                   </a:txBody>
                   <a:tcPr marL="68580" marR="68580" marT="34290" marB="34290">
                     <a:lnL w="12700" cap="flat" cmpd="sng" algn="ctr">
-                      <a:solidFill>
-                        <a:schemeClr val="tx1"/>
-                      </a:solidFill>
+                      <a:noFill/>
                       <a:prstDash val="dash"/>
                       <a:round/>
                       <a:headEnd type="none" w="med" len="med"/>
@@ -6211,9 +6110,7 @@
                       <a:tailEnd type="none" w="med" len="med"/>
                     </a:lnR>
                     <a:lnT w="12700" cap="flat" cmpd="sng" algn="ctr">
-                      <a:solidFill>
-                        <a:schemeClr val="tx1"/>
-                      </a:solidFill>
+                      <a:noFill/>
                       <a:prstDash val="dash"/>
                       <a:round/>
                       <a:headEnd type="none" w="med" len="med"/>
@@ -6263,9 +6160,7 @@
                       <a:tailEnd type="none" w="med" len="med"/>
                     </a:lnR>
                     <a:lnT w="12700" cap="flat" cmpd="sng" algn="ctr">
-                      <a:solidFill>
-                        <a:schemeClr val="tx1"/>
-                      </a:solidFill>
+                      <a:noFill/>
                       <a:prstDash val="dash"/>
                       <a:round/>
                       <a:headEnd type="none" w="med" len="med"/>
@@ -6308,18 +6203,14 @@
                       <a:tailEnd type="none" w="med" len="med"/>
                     </a:lnL>
                     <a:lnR w="12700" cap="flat" cmpd="sng" algn="ctr">
-                      <a:solidFill>
-                        <a:schemeClr val="tx1"/>
-                      </a:solidFill>
+                      <a:noFill/>
                       <a:prstDash val="dash"/>
                       <a:round/>
                       <a:headEnd type="none" w="med" len="med"/>
                       <a:tailEnd type="none" w="med" len="med"/>
                     </a:lnR>
                     <a:lnT w="12700" cap="flat" cmpd="sng" algn="ctr">
-                      <a:solidFill>
-                        <a:schemeClr val="tx1"/>
-                      </a:solidFill>
+                      <a:noFill/>
                       <a:prstDash val="dash"/>
                       <a:round/>
                       <a:headEnd type="none" w="med" len="med"/>
@@ -6358,9 +6249,7 @@
                   </a:txBody>
                   <a:tcPr marL="68580" marR="68580" marT="34290" marB="34290">
                     <a:lnL w="12700" cap="flat" cmpd="sng" algn="ctr">
-                      <a:solidFill>
-                        <a:schemeClr val="tx1"/>
-                      </a:solidFill>
+                      <a:noFill/>
                       <a:prstDash val="dash"/>
                       <a:round/>
                       <a:headEnd type="none" w="med" len="med"/>
@@ -6427,9 +6316,7 @@
                       <a:tailEnd type="none" w="med" len="med"/>
                     </a:lnL>
                     <a:lnR w="12700" cap="flat" cmpd="sng" algn="ctr">
-                      <a:solidFill>
-                        <a:schemeClr val="tx1"/>
-                      </a:solidFill>
+                      <a:noFill/>
                       <a:prstDash val="dash"/>
                       <a:round/>
                       <a:headEnd type="none" w="med" len="med"/>
@@ -6470,9 +6357,7 @@
                   </a:txBody>
                   <a:tcPr marL="68580" marR="68580" marT="34290" marB="34290">
                     <a:lnL w="12700" cap="flat" cmpd="sng" algn="ctr">
-                      <a:solidFill>
-                        <a:schemeClr val="tx1"/>
-                      </a:solidFill>
+                      <a:noFill/>
                       <a:prstDash val="dash"/>
                       <a:round/>
                       <a:headEnd type="none" w="med" len="med"/>
@@ -6587,9 +6472,7 @@
                       <a:tailEnd type="none" w="med" len="med"/>
                     </a:lnL>
                     <a:lnR w="12700" cap="flat" cmpd="sng" algn="ctr">
-                      <a:solidFill>
-                        <a:schemeClr val="tx1"/>
-                      </a:solidFill>
+                      <a:noFill/>
                       <a:prstDash val="dash"/>
                       <a:round/>
                       <a:headEnd type="none" w="med" len="med"/>
@@ -6634,9 +6517,7 @@
                   </a:txBody>
                   <a:tcPr marL="68580" marR="68580" marT="34290" marB="34290">
                     <a:lnL w="12700" cap="flat" cmpd="sng" algn="ctr">
-                      <a:solidFill>
-                        <a:schemeClr val="tx1"/>
-                      </a:solidFill>
+                      <a:noFill/>
                       <a:prstDash val="dash"/>
                       <a:round/>
                       <a:headEnd type="none" w="med" len="med"/>
@@ -6700,9 +6581,7 @@
                       <a:tailEnd type="none" w="med" len="med"/>
                     </a:lnL>
                     <a:lnR w="12700" cap="flat" cmpd="sng" algn="ctr">
-                      <a:solidFill>
-                        <a:schemeClr val="tx1"/>
-                      </a:solidFill>
+                      <a:noFill/>
                       <a:prstDash val="dash"/>
                       <a:round/>
                       <a:headEnd type="none" w="med" len="med"/>
@@ -6743,9 +6622,7 @@
                   </a:txBody>
                   <a:tcPr marL="68580" marR="68580" marT="34290" marB="34290">
                     <a:lnL w="12700" cap="flat" cmpd="sng" algn="ctr">
-                      <a:solidFill>
-                        <a:schemeClr val="tx1"/>
-                      </a:solidFill>
+                      <a:noFill/>
                       <a:prstDash val="dash"/>
                       <a:round/>
                       <a:headEnd type="none" w="med" len="med"/>
@@ -6766,9 +6643,7 @@
                       <a:tailEnd type="none" w="med" len="med"/>
                     </a:lnT>
                     <a:lnB w="12700" cap="flat" cmpd="sng" algn="ctr">
-                      <a:solidFill>
-                        <a:schemeClr val="tx1"/>
-                      </a:solidFill>
+                      <a:noFill/>
                       <a:prstDash val="dash"/>
                       <a:round/>
                       <a:headEnd type="none" w="med" len="med"/>
@@ -6820,9 +6695,7 @@
                       <a:tailEnd type="none" w="med" len="med"/>
                     </a:lnT>
                     <a:lnB w="12700" cap="flat" cmpd="sng" algn="ctr">
-                      <a:solidFill>
-                        <a:schemeClr val="tx1"/>
-                      </a:solidFill>
+                      <a:noFill/>
                       <a:prstDash val="dash"/>
                       <a:round/>
                       <a:headEnd type="none" w="med" len="med"/>
@@ -6860,9 +6733,7 @@
                       <a:tailEnd type="none" w="med" len="med"/>
                     </a:lnL>
                     <a:lnR w="12700" cap="flat" cmpd="sng" algn="ctr">
-                      <a:solidFill>
-                        <a:schemeClr val="tx1"/>
-                      </a:solidFill>
+                      <a:noFill/>
                       <a:prstDash val="dash"/>
                       <a:round/>
                       <a:headEnd type="none" w="med" len="med"/>
@@ -6876,9 +6747,7 @@
                       <a:tailEnd type="none" w="med" len="med"/>
                     </a:lnT>
                     <a:lnB w="12700" cap="flat" cmpd="sng" algn="ctr">
-                      <a:solidFill>
-                        <a:schemeClr val="tx1"/>
-                      </a:solidFill>
+                      <a:noFill/>
                       <a:prstDash val="dash"/>
                       <a:round/>
                       <a:headEnd type="none" w="med" len="med"/>
@@ -6909,9 +6778,7 @@
                   </a:txBody>
                   <a:tcPr marL="68580" marR="68580" marT="34290" marB="34290">
                     <a:lnL w="12700" cap="flat" cmpd="sng" algn="ctr">
-                      <a:solidFill>
-                        <a:schemeClr val="tx1"/>
-                      </a:solidFill>
+                      <a:noFill/>
                       <a:prstDash val="dash"/>
                       <a:round/>
                       <a:headEnd type="none" w="med" len="med"/>
@@ -7032,9 +6899,7 @@
                       <a:tailEnd type="none" w="med" len="med"/>
                     </a:lnR>
                     <a:lnT w="12700" cap="flat" cmpd="sng" algn="ctr">
-                      <a:solidFill>
-                        <a:schemeClr val="tx1"/>
-                      </a:solidFill>
+                      <a:noFill/>
                       <a:prstDash val="dash"/>
                       <a:round/>
                       <a:headEnd type="none" w="med" len="med"/>
@@ -7082,9 +6947,7 @@
                       <a:tailEnd type="none" w="med" len="med"/>
                     </a:lnR>
                     <a:lnT w="12700" cap="flat" cmpd="sng" algn="ctr">
-                      <a:solidFill>
-                        <a:schemeClr val="tx1"/>
-                      </a:solidFill>
+                      <a:noFill/>
                       <a:prstDash val="dash"/>
                       <a:round/>
                       <a:headEnd type="none" w="med" len="med"/>
@@ -7132,9 +6995,7 @@
                       <a:tailEnd type="none" w="med" len="med"/>
                     </a:lnR>
                     <a:lnT w="12700" cap="flat" cmpd="sng" algn="ctr">
-                      <a:solidFill>
-                        <a:schemeClr val="tx1"/>
-                      </a:solidFill>
+                      <a:noFill/>
                       <a:prstDash val="dash"/>
                       <a:round/>
                       <a:headEnd type="none" w="med" len="med"/>
@@ -7370,7 +7231,7 @@
         </p:nvSpPr>
         <p:spPr>
           <a:xfrm>
-            <a:off x="5037909" y="1210491"/>
+            <a:off x="5325292" y="878475"/>
             <a:ext cx="927462" cy="1029789"/>
           </a:xfrm>
           <a:prstGeom prst="rect">

</xml_diff>